<commit_message>
Se agregan de nuevo objetivos de desarrollo.
</commit_message>
<xml_diff>
--- a/1 - Planeacion/2 - Estrategia/Vison General TCP.pptx
+++ b/1 - Planeacion/2 - Estrategia/Vison General TCP.pptx
@@ -126,7 +126,7 @@
   </p:defaultTextStyle>
   <p:extLst>
     <p:ext uri="{EFAFB233-063F-42B5-8137-9DF3F51BA10A}">
-      <p15:sldGuideLst xmlns:p15="http://schemas.microsoft.com/office/powerpoint/2012/main">
+      <p15:sldGuideLst xmlns:p15="http://schemas.microsoft.com/office/powerpoint/2012/main" xmlns="">
         <p15:guide id="1" orient="horz" pos="2160">
           <p15:clr>
             <a:srgbClr val="A4A3A4"/>
@@ -225,7 +225,8 @@
           <a:p>
             <a:fld id="{913E59D8-236C-4128-A0EC-F62B5FBF1DF3}" type="datetimeFigureOut">
               <a:rPr lang="es-ES"/>
-              <a:t>10/03/2013</a:t>
+              <a:pPr/>
+              <a:t>18/03/2013</a:t>
             </a:fld>
             <a:endParaRPr lang="es-ES"/>
           </a:p>
@@ -383,6 +384,7 @@
           <a:p>
             <a:fld id="{1B79E786-4FD2-4A8F-B83F-9A68148B8C41}" type="slidenum">
               <a:rPr lang="es-ES"/>
+              <a:pPr/>
               <a:t>‹Nº›</a:t>
             </a:fld>
             <a:endParaRPr lang="es-ES"/>
@@ -392,7 +394,7 @@
     </p:spTree>
     <p:extLst>
       <p:ext uri="{BB962C8B-B14F-4D97-AF65-F5344CB8AC3E}">
-        <p14:creationId xmlns:p14="http://schemas.microsoft.com/office/powerpoint/2010/main" val="833443018"/>
+        <p14:creationId xmlns:p14="http://schemas.microsoft.com/office/powerpoint/2010/main" xmlns="" val="833443018"/>
       </p:ext>
     </p:extLst>
   </p:cSld>
@@ -557,7 +559,8 @@
           <a:p>
             <a:fld id="{1B79E786-4FD2-4A8F-B83F-9A68148B8C41}" type="slidenum">
               <a:rPr lang="es-ES"/>
-              <a:t>‹Nº›</a:t>
+              <a:pPr/>
+              <a:t>1</a:t>
             </a:fld>
             <a:endParaRPr lang="es-ES"/>
           </a:p>
@@ -566,7 +569,7 @@
     </p:spTree>
     <p:extLst>
       <p:ext uri="{BB962C8B-B14F-4D97-AF65-F5344CB8AC3E}">
-        <p14:creationId xmlns:p14="http://schemas.microsoft.com/office/powerpoint/2010/main" val="444573745"/>
+        <p14:creationId xmlns:p14="http://schemas.microsoft.com/office/powerpoint/2010/main" xmlns="" val="444573745"/>
       </p:ext>
     </p:extLst>
   </p:cSld>
@@ -641,7 +644,8 @@
           <a:p>
             <a:fld id="{1B79E786-4FD2-4A8F-B83F-9A68148B8C41}" type="slidenum">
               <a:rPr lang="es-ES"/>
-              <a:t>‹Nº›</a:t>
+              <a:pPr/>
+              <a:t>14</a:t>
             </a:fld>
             <a:endParaRPr lang="es-ES"/>
           </a:p>
@@ -650,7 +654,7 @@
     </p:spTree>
     <p:extLst>
       <p:ext uri="{BB962C8B-B14F-4D97-AF65-F5344CB8AC3E}">
-        <p14:creationId xmlns:p14="http://schemas.microsoft.com/office/powerpoint/2010/main" val="2671369434"/>
+        <p14:creationId xmlns:p14="http://schemas.microsoft.com/office/powerpoint/2010/main" xmlns="" val="2671369434"/>
       </p:ext>
     </p:extLst>
   </p:cSld>
@@ -725,7 +729,8 @@
           <a:p>
             <a:fld id="{1B79E786-4FD2-4A8F-B83F-9A68148B8C41}" type="slidenum">
               <a:rPr lang="es-ES"/>
-              <a:t>‹Nº›</a:t>
+              <a:pPr/>
+              <a:t>15</a:t>
             </a:fld>
             <a:endParaRPr lang="es-ES"/>
           </a:p>
@@ -734,7 +739,7 @@
     </p:spTree>
     <p:extLst>
       <p:ext uri="{BB962C8B-B14F-4D97-AF65-F5344CB8AC3E}">
-        <p14:creationId xmlns:p14="http://schemas.microsoft.com/office/powerpoint/2010/main" val="3107196932"/>
+        <p14:creationId xmlns:p14="http://schemas.microsoft.com/office/powerpoint/2010/main" xmlns="" val="3107196932"/>
       </p:ext>
     </p:extLst>
   </p:cSld>
@@ -809,7 +814,8 @@
           <a:p>
             <a:fld id="{1B79E786-4FD2-4A8F-B83F-9A68148B8C41}" type="slidenum">
               <a:rPr lang="es-ES"/>
-              <a:t>‹Nº›</a:t>
+              <a:pPr/>
+              <a:t>16</a:t>
             </a:fld>
             <a:endParaRPr lang="es-ES"/>
           </a:p>
@@ -818,7 +824,7 @@
     </p:spTree>
     <p:extLst>
       <p:ext uri="{BB962C8B-B14F-4D97-AF65-F5344CB8AC3E}">
-        <p14:creationId xmlns:p14="http://schemas.microsoft.com/office/powerpoint/2010/main" val="2450925760"/>
+        <p14:creationId xmlns:p14="http://schemas.microsoft.com/office/powerpoint/2010/main" xmlns="" val="2450925760"/>
       </p:ext>
     </p:extLst>
   </p:cSld>
@@ -893,7 +899,8 @@
           <a:p>
             <a:fld id="{1B79E786-4FD2-4A8F-B83F-9A68148B8C41}" type="slidenum">
               <a:rPr lang="es-ES"/>
-              <a:t>‹Nº›</a:t>
+              <a:pPr/>
+              <a:t>17</a:t>
             </a:fld>
             <a:endParaRPr lang="es-ES"/>
           </a:p>
@@ -902,7 +909,7 @@
     </p:spTree>
     <p:extLst>
       <p:ext uri="{BB962C8B-B14F-4D97-AF65-F5344CB8AC3E}">
-        <p14:creationId xmlns:p14="http://schemas.microsoft.com/office/powerpoint/2010/main" val="1338460518"/>
+        <p14:creationId xmlns:p14="http://schemas.microsoft.com/office/powerpoint/2010/main" xmlns="" val="1338460518"/>
       </p:ext>
     </p:extLst>
   </p:cSld>
@@ -977,7 +984,8 @@
           <a:p>
             <a:fld id="{1B79E786-4FD2-4A8F-B83F-9A68148B8C41}" type="slidenum">
               <a:rPr lang="es-ES"/>
-              <a:t>‹Nº›</a:t>
+              <a:pPr/>
+              <a:t>18</a:t>
             </a:fld>
             <a:endParaRPr lang="es-ES"/>
           </a:p>
@@ -986,7 +994,7 @@
     </p:spTree>
     <p:extLst>
       <p:ext uri="{BB962C8B-B14F-4D97-AF65-F5344CB8AC3E}">
-        <p14:creationId xmlns:p14="http://schemas.microsoft.com/office/powerpoint/2010/main" val="1305142560"/>
+        <p14:creationId xmlns:p14="http://schemas.microsoft.com/office/powerpoint/2010/main" xmlns="" val="1305142560"/>
       </p:ext>
     </p:extLst>
   </p:cSld>
@@ -1061,7 +1069,8 @@
           <a:p>
             <a:fld id="{1B79E786-4FD2-4A8F-B83F-9A68148B8C41}" type="slidenum">
               <a:rPr lang="es-ES"/>
-              <a:t>‹Nº›</a:t>
+              <a:pPr/>
+              <a:t>2</a:t>
             </a:fld>
             <a:endParaRPr lang="es-ES"/>
           </a:p>
@@ -1070,7 +1079,7 @@
     </p:spTree>
     <p:extLst>
       <p:ext uri="{BB962C8B-B14F-4D97-AF65-F5344CB8AC3E}">
-        <p14:creationId xmlns:p14="http://schemas.microsoft.com/office/powerpoint/2010/main" val="827615994"/>
+        <p14:creationId xmlns:p14="http://schemas.microsoft.com/office/powerpoint/2010/main" xmlns="" val="827615994"/>
       </p:ext>
     </p:extLst>
   </p:cSld>
@@ -1145,7 +1154,8 @@
           <a:p>
             <a:fld id="{1B79E786-4FD2-4A8F-B83F-9A68148B8C41}" type="slidenum">
               <a:rPr lang="es-ES"/>
-              <a:t>‹Nº›</a:t>
+              <a:pPr/>
+              <a:t>3</a:t>
             </a:fld>
             <a:endParaRPr lang="es-ES"/>
           </a:p>
@@ -1154,7 +1164,7 @@
     </p:spTree>
     <p:extLst>
       <p:ext uri="{BB962C8B-B14F-4D97-AF65-F5344CB8AC3E}">
-        <p14:creationId xmlns:p14="http://schemas.microsoft.com/office/powerpoint/2010/main" val="331256157"/>
+        <p14:creationId xmlns:p14="http://schemas.microsoft.com/office/powerpoint/2010/main" xmlns="" val="331256157"/>
       </p:ext>
     </p:extLst>
   </p:cSld>
@@ -1229,7 +1239,8 @@
           <a:p>
             <a:fld id="{1B79E786-4FD2-4A8F-B83F-9A68148B8C41}" type="slidenum">
               <a:rPr lang="es-ES"/>
-              <a:t>‹Nº›</a:t>
+              <a:pPr/>
+              <a:t>4</a:t>
             </a:fld>
             <a:endParaRPr lang="es-ES"/>
           </a:p>
@@ -1238,7 +1249,7 @@
     </p:spTree>
     <p:extLst>
       <p:ext uri="{BB962C8B-B14F-4D97-AF65-F5344CB8AC3E}">
-        <p14:creationId xmlns:p14="http://schemas.microsoft.com/office/powerpoint/2010/main" val="791004675"/>
+        <p14:creationId xmlns:p14="http://schemas.microsoft.com/office/powerpoint/2010/main" xmlns="" val="791004675"/>
       </p:ext>
     </p:extLst>
   </p:cSld>
@@ -1313,7 +1324,8 @@
           <a:p>
             <a:fld id="{1B79E786-4FD2-4A8F-B83F-9A68148B8C41}" type="slidenum">
               <a:rPr lang="es-ES"/>
-              <a:t>‹Nº›</a:t>
+              <a:pPr/>
+              <a:t>5</a:t>
             </a:fld>
             <a:endParaRPr lang="es-ES"/>
           </a:p>
@@ -1322,7 +1334,7 @@
     </p:spTree>
     <p:extLst>
       <p:ext uri="{BB962C8B-B14F-4D97-AF65-F5344CB8AC3E}">
-        <p14:creationId xmlns:p14="http://schemas.microsoft.com/office/powerpoint/2010/main" val="3210474303"/>
+        <p14:creationId xmlns:p14="http://schemas.microsoft.com/office/powerpoint/2010/main" xmlns="" val="3210474303"/>
       </p:ext>
     </p:extLst>
   </p:cSld>
@@ -1397,7 +1409,8 @@
           <a:p>
             <a:fld id="{1B79E786-4FD2-4A8F-B83F-9A68148B8C41}" type="slidenum">
               <a:rPr lang="es-ES"/>
-              <a:t>‹Nº›</a:t>
+              <a:pPr/>
+              <a:t>6</a:t>
             </a:fld>
             <a:endParaRPr lang="es-ES"/>
           </a:p>
@@ -1406,7 +1419,7 @@
     </p:spTree>
     <p:extLst>
       <p:ext uri="{BB962C8B-B14F-4D97-AF65-F5344CB8AC3E}">
-        <p14:creationId xmlns:p14="http://schemas.microsoft.com/office/powerpoint/2010/main" val="1282391733"/>
+        <p14:creationId xmlns:p14="http://schemas.microsoft.com/office/powerpoint/2010/main" xmlns="" val="1282391733"/>
       </p:ext>
     </p:extLst>
   </p:cSld>
@@ -1481,7 +1494,8 @@
           <a:p>
             <a:fld id="{1B79E786-4FD2-4A8F-B83F-9A68148B8C41}" type="slidenum">
               <a:rPr lang="es-ES"/>
-              <a:t>‹Nº›</a:t>
+              <a:pPr/>
+              <a:t>7</a:t>
             </a:fld>
             <a:endParaRPr lang="es-ES"/>
           </a:p>
@@ -1490,7 +1504,7 @@
     </p:spTree>
     <p:extLst>
       <p:ext uri="{BB962C8B-B14F-4D97-AF65-F5344CB8AC3E}">
-        <p14:creationId xmlns:p14="http://schemas.microsoft.com/office/powerpoint/2010/main" val="1182916069"/>
+        <p14:creationId xmlns:p14="http://schemas.microsoft.com/office/powerpoint/2010/main" xmlns="" val="1182916069"/>
       </p:ext>
     </p:extLst>
   </p:cSld>
@@ -1565,7 +1579,8 @@
           <a:p>
             <a:fld id="{1B79E786-4FD2-4A8F-B83F-9A68148B8C41}" type="slidenum">
               <a:rPr lang="es-ES"/>
-              <a:t>‹Nº›</a:t>
+              <a:pPr/>
+              <a:t>8</a:t>
             </a:fld>
             <a:endParaRPr lang="es-ES"/>
           </a:p>
@@ -1574,7 +1589,7 @@
     </p:spTree>
     <p:extLst>
       <p:ext uri="{BB962C8B-B14F-4D97-AF65-F5344CB8AC3E}">
-        <p14:creationId xmlns:p14="http://schemas.microsoft.com/office/powerpoint/2010/main" val="2720515047"/>
+        <p14:creationId xmlns:p14="http://schemas.microsoft.com/office/powerpoint/2010/main" xmlns="" val="2720515047"/>
       </p:ext>
     </p:extLst>
   </p:cSld>
@@ -1649,7 +1664,8 @@
           <a:p>
             <a:fld id="{1B79E786-4FD2-4A8F-B83F-9A68148B8C41}" type="slidenum">
               <a:rPr lang="es-ES"/>
-              <a:t>‹Nº›</a:t>
+              <a:pPr/>
+              <a:t>13</a:t>
             </a:fld>
             <a:endParaRPr lang="es-ES"/>
           </a:p>
@@ -1658,7 +1674,7 @@
     </p:spTree>
     <p:extLst>
       <p:ext uri="{BB962C8B-B14F-4D97-AF65-F5344CB8AC3E}">
-        <p14:creationId xmlns:p14="http://schemas.microsoft.com/office/powerpoint/2010/main" val="1163859630"/>
+        <p14:creationId xmlns:p14="http://schemas.microsoft.com/office/powerpoint/2010/main" xmlns="" val="1163859630"/>
       </p:ext>
     </p:extLst>
   </p:cSld>
@@ -1850,7 +1866,7 @@
             <a:fld id="{2C60F05F-D2FA-4626-9515-3950F186493E}" type="datetimeFigureOut">
               <a:rPr lang="es-CO" smtClean="0"/>
               <a:pPr/>
-              <a:t>10/03/2013</a:t>
+              <a:t>18/03/2013</a:t>
             </a:fld>
             <a:endParaRPr lang="es-CO"/>
           </a:p>
@@ -2017,7 +2033,7 @@
             <a:fld id="{2C60F05F-D2FA-4626-9515-3950F186493E}" type="datetimeFigureOut">
               <a:rPr lang="es-CO" smtClean="0"/>
               <a:pPr/>
-              <a:t>10/03/2013</a:t>
+              <a:t>18/03/2013</a:t>
             </a:fld>
             <a:endParaRPr lang="es-CO"/>
           </a:p>
@@ -2194,7 +2210,7 @@
             <a:fld id="{2C60F05F-D2FA-4626-9515-3950F186493E}" type="datetimeFigureOut">
               <a:rPr lang="es-CO" smtClean="0"/>
               <a:pPr/>
-              <a:t>10/03/2013</a:t>
+              <a:t>18/03/2013</a:t>
             </a:fld>
             <a:endParaRPr lang="es-CO"/>
           </a:p>
@@ -2361,7 +2377,7 @@
             <a:fld id="{2C60F05F-D2FA-4626-9515-3950F186493E}" type="datetimeFigureOut">
               <a:rPr lang="es-CO" smtClean="0"/>
               <a:pPr/>
-              <a:t>10/03/2013</a:t>
+              <a:t>18/03/2013</a:t>
             </a:fld>
             <a:endParaRPr lang="es-CO"/>
           </a:p>
@@ -2604,7 +2620,7 @@
             <a:fld id="{2C60F05F-D2FA-4626-9515-3950F186493E}" type="datetimeFigureOut">
               <a:rPr lang="es-CO" smtClean="0"/>
               <a:pPr/>
-              <a:t>10/03/2013</a:t>
+              <a:t>18/03/2013</a:t>
             </a:fld>
             <a:endParaRPr lang="es-CO"/>
           </a:p>
@@ -2889,7 +2905,7 @@
             <a:fld id="{2C60F05F-D2FA-4626-9515-3950F186493E}" type="datetimeFigureOut">
               <a:rPr lang="es-CO" smtClean="0"/>
               <a:pPr/>
-              <a:t>10/03/2013</a:t>
+              <a:t>18/03/2013</a:t>
             </a:fld>
             <a:endParaRPr lang="es-CO"/>
           </a:p>
@@ -3308,7 +3324,7 @@
             <a:fld id="{2C60F05F-D2FA-4626-9515-3950F186493E}" type="datetimeFigureOut">
               <a:rPr lang="es-CO" smtClean="0"/>
               <a:pPr/>
-              <a:t>10/03/2013</a:t>
+              <a:t>18/03/2013</a:t>
             </a:fld>
             <a:endParaRPr lang="es-CO"/>
           </a:p>
@@ -3423,7 +3439,7 @@
             <a:fld id="{2C60F05F-D2FA-4626-9515-3950F186493E}" type="datetimeFigureOut">
               <a:rPr lang="es-CO" smtClean="0"/>
               <a:pPr/>
-              <a:t>10/03/2013</a:t>
+              <a:t>18/03/2013</a:t>
             </a:fld>
             <a:endParaRPr lang="es-CO"/>
           </a:p>
@@ -3515,7 +3531,7 @@
             <a:fld id="{2C60F05F-D2FA-4626-9515-3950F186493E}" type="datetimeFigureOut">
               <a:rPr lang="es-CO" smtClean="0"/>
               <a:pPr/>
-              <a:t>10/03/2013</a:t>
+              <a:t>18/03/2013</a:t>
             </a:fld>
             <a:endParaRPr lang="es-CO"/>
           </a:p>
@@ -3789,7 +3805,7 @@
             <a:fld id="{2C60F05F-D2FA-4626-9515-3950F186493E}" type="datetimeFigureOut">
               <a:rPr lang="es-CO" smtClean="0"/>
               <a:pPr/>
-              <a:t>10/03/2013</a:t>
+              <a:t>18/03/2013</a:t>
             </a:fld>
             <a:endParaRPr lang="es-CO"/>
           </a:p>
@@ -4039,7 +4055,7 @@
             <a:fld id="{2C60F05F-D2FA-4626-9515-3950F186493E}" type="datetimeFigureOut">
               <a:rPr lang="es-CO" smtClean="0"/>
               <a:pPr/>
-              <a:t>10/03/2013</a:t>
+              <a:t>18/03/2013</a:t>
             </a:fld>
             <a:endParaRPr lang="es-CO"/>
           </a:p>
@@ -4249,7 +4265,7 @@
             <a:fld id="{2C60F05F-D2FA-4626-9515-3950F186493E}" type="datetimeFigureOut">
               <a:rPr lang="es-CO" smtClean="0"/>
               <a:pPr/>
-              <a:t>10/03/2013</a:t>
+              <a:t>18/03/2013</a:t>
             </a:fld>
             <a:endParaRPr lang="es-CO"/>
           </a:p>
@@ -5021,75 +5037,66 @@
         <p:spPr/>
         <p:txBody>
           <a:bodyPr>
-            <a:normAutofit fontScale="70000" lnSpcReduction="20000"/>
+            <a:normAutofit/>
           </a:bodyPr>
           <a:lstStyle/>
           <a:p>
             <a:r>
-              <a:rPr lang="es-CO" dirty="0" smtClean="0"/>
-              <a:t>Luis Andrés Olarte Zabala:</a:t>
-            </a:r>
-          </a:p>
-          <a:p>
-            <a:r>
-              <a:rPr lang="es-CO" smtClean="0"/>
-              <a:t>Objetivo General</a:t>
-            </a:r>
-            <a:endParaRPr lang="es-CO" dirty="0" smtClean="0"/>
+              <a:rPr lang="es-CO" b="1" dirty="0" smtClean="0"/>
+              <a:t>Luis Andrés Olarte Zabala</a:t>
+            </a:r>
+            <a:r>
+              <a:rPr lang="es-CO" b="1" dirty="0" smtClean="0"/>
+              <a:t>:</a:t>
+            </a:r>
           </a:p>
           <a:p>
             <a:pPr>
               <a:buNone/>
             </a:pPr>
             <a:r>
-              <a:rPr lang="es-CO" dirty="0" smtClean="0"/>
-              <a:t>     Facilitar técnica y conceptualmente los requerimientos del usuario y velar por el cumplimiento de estos.</a:t>
-            </a:r>
-          </a:p>
-          <a:p>
-            <a:r>
-              <a:rPr lang="es-CO" dirty="0" smtClean="0"/>
-              <a:t>Metas: </a:t>
-            </a:r>
+              <a:rPr lang="es-CO" b="1" dirty="0" smtClean="0"/>
+              <a:t> </a:t>
+            </a:r>
+            <a:r>
+              <a:rPr lang="es-CO" b="1" dirty="0" smtClean="0"/>
+              <a:t>	</a:t>
+            </a:r>
+            <a:r>
+              <a:rPr lang="es-CO" dirty="0" smtClean="0"/>
+              <a:t>Conocimientos técnicos en la plataforma seleccionada por el grupo.</a:t>
+            </a:r>
+          </a:p>
+          <a:p>
+            <a:pPr>
+              <a:buNone/>
+            </a:pPr>
+            <a:r>
+              <a:rPr lang="es-CO" b="1" dirty="0" smtClean="0"/>
+              <a:t>	</a:t>
+            </a:r>
+            <a:r>
+              <a:rPr lang="es-CO" dirty="0" smtClean="0"/>
+              <a:t>Capacidad en organización y conocimiento en el campo del desarrollo.</a:t>
+            </a:r>
+          </a:p>
+          <a:p>
+            <a:pPr>
+              <a:buNone/>
+            </a:pPr>
+            <a:r>
+              <a:rPr lang="es-CO" b="1" dirty="0" smtClean="0"/>
+              <a:t>	</a:t>
+            </a:r>
+            <a:r>
+              <a:rPr lang="es-CO" dirty="0" smtClean="0"/>
+              <a:t>Experiencia con problemas comunes en el desarrollo.</a:t>
+            </a:r>
+            <a:endParaRPr lang="es-CO" dirty="0" smtClean="0"/>
           </a:p>
           <a:p>
             <a:pPr lvl="1"/>
-            <a:r>
-              <a:rPr lang="es-CO" dirty="0" smtClean="0"/>
-              <a:t>Definir técnicamente el 100% de los requerimientos.</a:t>
-            </a:r>
-          </a:p>
-          <a:p>
-            <a:pPr lvl="1"/>
-            <a:r>
-              <a:rPr lang="es-CO" dirty="0" smtClean="0"/>
-              <a:t>Resolver el 100% de las dudas técnicas de los integrantes del grupo.</a:t>
-            </a:r>
-          </a:p>
-          <a:p>
-            <a:pPr lvl="1"/>
-            <a:r>
-              <a:rPr lang="es-CO" dirty="0" smtClean="0"/>
-              <a:t>Crear los estándares de codificación para la aplicación y velar por  el 100% del cumplimiento de estos.</a:t>
-            </a:r>
-          </a:p>
-          <a:p>
-            <a:pPr lvl="1"/>
-            <a:r>
-              <a:rPr lang="es-CO" dirty="0" smtClean="0"/>
-              <a:t>Analizar y plantear soluciones para el 100% de los problemas técnicos de los integrantes del grupo.</a:t>
-            </a:r>
-          </a:p>
-          <a:p>
-            <a:pPr lvl="1"/>
-            <a:r>
-              <a:rPr lang="es-CO" dirty="0" smtClean="0"/>
-              <a:t>Analizar y dar aval técnico al 100% de los casos de uso y encontrar los problemas durante el análisis de estos.</a:t>
-            </a:r>
-          </a:p>
-          <a:p>
-            <a:pPr lvl="1"/>
-            <a:endParaRPr lang="es-CO" dirty="0"/>
+            <a:endParaRPr lang="es-CO" u="sng" dirty="0"/>
           </a:p>
         </p:txBody>
       </p:sp>
@@ -6108,7 +6115,9 @@
         </p:nvSpPr>
         <p:spPr/>
         <p:txBody>
-          <a:bodyPr/>
+          <a:bodyPr>
+            <a:normAutofit fontScale="70000" lnSpcReduction="20000"/>
+          </a:bodyPr>
           <a:lstStyle/>
           <a:p>
             <a:r>
@@ -6117,7 +6126,130 @@
             </a:r>
           </a:p>
           <a:p>
+            <a:r>
+              <a:rPr lang="es-CO" b="1" dirty="0" smtClean="0"/>
+              <a:t>Objetivo General</a:t>
+            </a:r>
+          </a:p>
+          <a:p>
+            <a:pPr>
+              <a:buNone/>
+            </a:pPr>
+            <a:r>
+              <a:rPr lang="es-CO" dirty="0" smtClean="0"/>
+              <a:t>     Facilitar técnica y conceptualmente los requerimientos del usuario y velar por el desarrollo de estos y el cumplimiento de las normas establecidas por el grupo.</a:t>
+            </a:r>
+          </a:p>
+          <a:p>
+            <a:r>
+              <a:rPr lang="es-CO" b="1" dirty="0" smtClean="0"/>
+              <a:t>Metas: </a:t>
+            </a:r>
+          </a:p>
+          <a:p>
             <a:pPr lvl="1"/>
+            <a:r>
+              <a:rPr lang="es-CO" dirty="0" smtClean="0"/>
+              <a:t>Definir técnicamente por lo menos el </a:t>
+            </a:r>
+            <a:r>
+              <a:rPr lang="es-CO" dirty="0" smtClean="0">
+                <a:solidFill>
+                  <a:schemeClr val="tx2">
+                    <a:lumMod val="75000"/>
+                  </a:schemeClr>
+                </a:solidFill>
+              </a:rPr>
+              <a:t>80% </a:t>
+            </a:r>
+            <a:r>
+              <a:rPr lang="es-CO" dirty="0" smtClean="0"/>
+              <a:t>de los requerimientos.</a:t>
+            </a:r>
+          </a:p>
+          <a:p>
+            <a:pPr lvl="1"/>
+            <a:r>
+              <a:rPr lang="es-CO" dirty="0" smtClean="0"/>
+              <a:t>Resolver el </a:t>
+            </a:r>
+            <a:r>
+              <a:rPr lang="es-CO" dirty="0" smtClean="0">
+                <a:solidFill>
+                  <a:schemeClr val="tx2">
+                    <a:lumMod val="75000"/>
+                  </a:schemeClr>
+                </a:solidFill>
+              </a:rPr>
+              <a:t>80% </a:t>
+            </a:r>
+            <a:r>
+              <a:rPr lang="es-CO" dirty="0" smtClean="0"/>
+              <a:t>de las dudas técnicas de los integrantes del grupo.</a:t>
+            </a:r>
+          </a:p>
+          <a:p>
+            <a:pPr lvl="1"/>
+            <a:r>
+              <a:rPr lang="es-CO" dirty="0" smtClean="0"/>
+              <a:t>Crear los estándares de codificación para la aplicación y velar por  el </a:t>
+            </a:r>
+            <a:r>
+              <a:rPr lang="es-CO" dirty="0" smtClean="0">
+                <a:solidFill>
+                  <a:schemeClr val="tx2">
+                    <a:lumMod val="75000"/>
+                  </a:schemeClr>
+                </a:solidFill>
+              </a:rPr>
+              <a:t>80% </a:t>
+            </a:r>
+            <a:r>
+              <a:rPr lang="es-CO" dirty="0" smtClean="0"/>
+              <a:t>del cumplimiento de estos.</a:t>
+            </a:r>
+          </a:p>
+          <a:p>
+            <a:pPr lvl="1"/>
+            <a:r>
+              <a:rPr lang="es-CO" dirty="0" smtClean="0"/>
+              <a:t>Analizar y plantear soluciones para el </a:t>
+            </a:r>
+            <a:r>
+              <a:rPr lang="es-CO" dirty="0" smtClean="0">
+                <a:solidFill>
+                  <a:schemeClr val="tx2">
+                    <a:lumMod val="75000"/>
+                  </a:schemeClr>
+                </a:solidFill>
+              </a:rPr>
+              <a:t>80% </a:t>
+            </a:r>
+            <a:r>
+              <a:rPr lang="es-CO" dirty="0" smtClean="0"/>
+              <a:t>de los problemas técnicos de los integrantes del grupo.</a:t>
+            </a:r>
+          </a:p>
+          <a:p>
+            <a:pPr lvl="1"/>
+            <a:r>
+              <a:rPr lang="es-CO" dirty="0" smtClean="0"/>
+              <a:t>Analizar y dar aval técnico por lo menos al </a:t>
+            </a:r>
+            <a:r>
+              <a:rPr lang="es-CO" dirty="0" smtClean="0">
+                <a:solidFill>
+                  <a:schemeClr val="tx2">
+                    <a:lumMod val="75000"/>
+                  </a:schemeClr>
+                </a:solidFill>
+              </a:rPr>
+              <a:t>80% </a:t>
+            </a:r>
+            <a:r>
+              <a:rPr lang="es-CO" dirty="0" smtClean="0"/>
+              <a:t>de los casos de uso y encontrar los problemas durante el análisis de estos</a:t>
+            </a:r>
             <a:endParaRPr lang="es-CO" dirty="0"/>
           </a:p>
         </p:txBody>
@@ -6640,7 +6772,7 @@
     </a:clrScheme>
     <a:fontScheme name="Office">
       <a:majorFont>
-        <a:latin typeface="Calibri Light" panose="020F0302020204030204"/>
+        <a:latin typeface="Calibri Light"/>
         <a:ea typeface=""/>
         <a:cs typeface=""/>
         <a:font script="Jpan" typeface="ＭＳ Ｐゴシック"/>
@@ -6675,7 +6807,7 @@
         <a:font script="Geor" typeface="Sylfaen"/>
       </a:majorFont>
       <a:minorFont>
-        <a:latin typeface="Calibri" panose="020F0502020204030204"/>
+        <a:latin typeface="Calibri"/>
         <a:ea typeface=""/>
         <a:cs typeface=""/>
         <a:font script="Jpan" typeface="ＭＳ Ｐゴシック"/>
@@ -6852,7 +6984,7 @@
   <a:extraClrSchemeLst/>
   <a:extLst>
     <a:ext uri="{05A4C25C-085E-4340-85A3-A5531E510DB2}">
-      <thm15:themeFamily xmlns:thm15="http://schemas.microsoft.com/office/thememl/2012/main" name="Office Theme" id="{62F939B6-93AF-4DB8-9C6B-D6C7DFDC589F}" vid="{4A3C46E8-61CC-4603-A589-7422A47A8E4A}"/>
+      <thm15:themeFamily xmlns:thm15="http://schemas.microsoft.com/office/thememl/2012/main" xmlns="" name="Office Theme" id="{62F939B6-93AF-4DB8-9C6B-D6C7DFDC589F}" vid="{4A3C46E8-61CC-4603-A589-7422A47A8E4A}"/>
     </a:ext>
   </a:extLst>
 </a:theme>

</xml_diff>